<commit_message>
adding content in ppt
</commit_message>
<xml_diff>
--- a/PPT/Yelp Presentation.pptx
+++ b/PPT/Yelp Presentation.pptx
@@ -5,7 +5,7 @@
     <p:sldMasterId id="2147483648" r:id="rId1"/>
   </p:sldMasterIdLst>
   <p:notesMasterIdLst>
-    <p:notesMasterId r:id="rId21"/>
+    <p:notesMasterId r:id="rId22"/>
   </p:notesMasterIdLst>
   <p:sldIdLst>
     <p:sldId id="256" r:id="rId2"/>
@@ -18,38 +18,39 @@
     <p:sldId id="263" r:id="rId9"/>
     <p:sldId id="264" r:id="rId10"/>
     <p:sldId id="265" r:id="rId11"/>
-    <p:sldId id="266" r:id="rId12"/>
-    <p:sldId id="267" r:id="rId13"/>
-    <p:sldId id="260" r:id="rId14"/>
-    <p:sldId id="268" r:id="rId15"/>
-    <p:sldId id="269" r:id="rId16"/>
-    <p:sldId id="270" r:id="rId17"/>
-    <p:sldId id="271" r:id="rId18"/>
-    <p:sldId id="272" r:id="rId19"/>
-    <p:sldId id="273" r:id="rId20"/>
+    <p:sldId id="275" r:id="rId12"/>
+    <p:sldId id="266" r:id="rId13"/>
+    <p:sldId id="267" r:id="rId14"/>
+    <p:sldId id="260" r:id="rId15"/>
+    <p:sldId id="268" r:id="rId16"/>
+    <p:sldId id="269" r:id="rId17"/>
+    <p:sldId id="270" r:id="rId18"/>
+    <p:sldId id="271" r:id="rId19"/>
+    <p:sldId id="272" r:id="rId20"/>
+    <p:sldId id="273" r:id="rId21"/>
   </p:sldIdLst>
   <p:sldSz cx="9144000" cy="5143500" type="screen16x9"/>
   <p:notesSz cx="6858000" cy="9144000"/>
   <p:embeddedFontLst>
     <p:embeddedFont>
       <p:font typeface="Average" panose="020B0604020202020204" charset="0"/>
-      <p:regular r:id="rId22"/>
+      <p:regular r:id="rId23"/>
     </p:embeddedFont>
     <p:embeddedFont>
       <p:font typeface="Bree Serif" panose="020B0604020202020204" charset="0"/>
-      <p:regular r:id="rId23"/>
+      <p:regular r:id="rId24"/>
     </p:embeddedFont>
     <p:embeddedFont>
       <p:font typeface="Oswald" panose="020B0604020202020204" charset="0"/>
-      <p:regular r:id="rId24"/>
-      <p:bold r:id="rId25"/>
+      <p:regular r:id="rId25"/>
+      <p:bold r:id="rId26"/>
     </p:embeddedFont>
     <p:embeddedFont>
       <p:font typeface="Roboto Mono" panose="020B0604020202020204" charset="0"/>
-      <p:regular r:id="rId26"/>
-      <p:bold r:id="rId27"/>
-      <p:italic r:id="rId28"/>
-      <p:boldItalic r:id="rId29"/>
+      <p:regular r:id="rId27"/>
+      <p:bold r:id="rId28"/>
+      <p:italic r:id="rId29"/>
+      <p:boldItalic r:id="rId30"/>
     </p:embeddedFont>
   </p:embeddedFontLst>
   <p:defaultTextStyle>
@@ -297,7 +298,7 @@
       </p15:sldGuideLst>
     </p:ext>
     <p:ext uri="http://customooxmlschemas.google.com/">
-      <go:slidesCustomData xmlns:go="http://customooxmlschemas.google.com/" xmlns:p15="http://schemas.microsoft.com/office/powerpoint/2012/main" xmlns:p14="http://schemas.microsoft.com/office/powerpoint/2010/main" xmlns:com="http://schemas.openxmlformats.org/drawingml/2006/compatibility" xmlns:pvml="urn:schemas-microsoft-com:office:powerpoint" xmlns:v="urn:schemas-microsoft-com:vml" xmlns:o="urn:schemas-microsoft-com:office:office" xmlns:dgm="http://schemas.openxmlformats.org/drawingml/2006/diagram" xmlns:c="http://schemas.openxmlformats.org/drawingml/2006/chart" xmlns:mv="urn:schemas-microsoft-com:mac:vml" xmlns:mc="http://schemas.openxmlformats.org/markup-compatibility/2006" xmlns="" r:id="rId32" roundtripDataSignature="AMtx7mhrN0VZjpMeXmHQaTxH0fmdJEZUYA=="/>
+      <go:slidesCustomData xmlns="" xmlns:mc="http://schemas.openxmlformats.org/markup-compatibility/2006" xmlns:mv="urn:schemas-microsoft-com:mac:vml" xmlns:c="http://schemas.openxmlformats.org/drawingml/2006/chart" xmlns:dgm="http://schemas.openxmlformats.org/drawingml/2006/diagram" xmlns:o="urn:schemas-microsoft-com:office:office" xmlns:v="urn:schemas-microsoft-com:vml" xmlns:pvml="urn:schemas-microsoft-com:office:powerpoint" xmlns:com="http://schemas.openxmlformats.org/drawingml/2006/compatibility" xmlns:p14="http://schemas.microsoft.com/office/powerpoint/2010/main" xmlns:p15="http://schemas.microsoft.com/office/powerpoint/2012/main" xmlns:go="http://customooxmlschemas.google.com/" r:id="rId32" roundtripDataSignature="AMtx7mhrN0VZjpMeXmHQaTxH0fmdJEZUYA=="/>
     </p:ext>
   </p:extLst>
 </p:presentation>
@@ -1013,6 +1014,149 @@
   <p:cSld>
     <p:spTree>
       <p:nvGrpSpPr>
+        <p:cNvPr id="1" name="Shape 130"/>
+        <p:cNvGrpSpPr/>
+        <p:nvPr/>
+      </p:nvGrpSpPr>
+      <p:grpSpPr>
+        <a:xfrm>
+          <a:off x="0" y="0"/>
+          <a:ext cx="0" cy="0"/>
+          <a:chOff x="0" y="0"/>
+          <a:chExt cx="0" cy="0"/>
+        </a:xfrm>
+      </p:grpSpPr>
+      <p:sp>
+        <p:nvSpPr>
+          <p:cNvPr id="131" name="Google Shape;131;g83ddf61570_0_20:notes"/>
+          <p:cNvSpPr>
+            <a:spLocks noGrp="1" noRot="1" noChangeAspect="1"/>
+          </p:cNvSpPr>
+          <p:nvPr>
+            <p:ph type="sldImg" idx="2"/>
+          </p:nvPr>
+        </p:nvSpPr>
+        <p:spPr>
+          <a:xfrm>
+            <a:off x="381000" y="685800"/>
+            <a:ext cx="6096000" cy="3429000"/>
+          </a:xfrm>
+          <a:custGeom>
+            <a:avLst/>
+            <a:gdLst/>
+            <a:ahLst/>
+            <a:cxnLst/>
+            <a:rect l="l" t="t" r="r" b="b"/>
+            <a:pathLst>
+              <a:path w="120000" h="120000" extrusionOk="0">
+                <a:moveTo>
+                  <a:pt x="0" y="0"/>
+                </a:moveTo>
+                <a:lnTo>
+                  <a:pt x="120000" y="0"/>
+                </a:lnTo>
+                <a:lnTo>
+                  <a:pt x="120000" y="120000"/>
+                </a:lnTo>
+                <a:lnTo>
+                  <a:pt x="0" y="120000"/>
+                </a:lnTo>
+                <a:close/>
+              </a:path>
+            </a:pathLst>
+          </a:custGeom>
+          <a:noFill/>
+          <a:ln w="9525" cap="flat" cmpd="sng">
+            <a:solidFill>
+              <a:srgbClr val="000000"/>
+            </a:solidFill>
+            <a:prstDash val="solid"/>
+            <a:round/>
+            <a:headEnd type="none" w="sm" len="sm"/>
+            <a:tailEnd type="none" w="sm" len="sm"/>
+          </a:ln>
+        </p:spPr>
+      </p:sp>
+      <p:sp>
+        <p:nvSpPr>
+          <p:cNvPr id="132" name="Google Shape;132;g83ddf61570_0_20:notes"/>
+          <p:cNvSpPr txBox="1">
+            <a:spLocks noGrp="1"/>
+          </p:cNvSpPr>
+          <p:nvPr>
+            <p:ph type="body" idx="1"/>
+          </p:nvPr>
+        </p:nvSpPr>
+        <p:spPr>
+          <a:xfrm>
+            <a:off x="685800" y="4343400"/>
+            <a:ext cx="5486400" cy="4114800"/>
+          </a:xfrm>
+          <a:prstGeom prst="rect">
+            <a:avLst/>
+          </a:prstGeom>
+          <a:noFill/>
+          <a:ln>
+            <a:noFill/>
+          </a:ln>
+        </p:spPr>
+        <p:txBody>
+          <a:bodyPr spcFirstLastPara="1" wrap="square" lIns="91425" tIns="91425" rIns="91425" bIns="91425" anchor="t" anchorCtr="0">
+            <a:noAutofit/>
+          </a:bodyPr>
+          <a:lstStyle/>
+          <a:p>
+            <a:pPr marL="0" lvl="0" indent="0" algn="l" rtl="0">
+              <a:lnSpc>
+                <a:spcPct val="100000"/>
+              </a:lnSpc>
+              <a:spcBef>
+                <a:spcPts val="0"/>
+              </a:spcBef>
+              <a:spcAft>
+                <a:spcPts val="0"/>
+              </a:spcAft>
+              <a:buSzPts val="1100"/>
+              <a:buNone/>
+            </a:pPr>
+            <a:r>
+              <a:rPr lang="en-US" dirty="0"/>
+              <a:t>- We cannot state Illinois exploration in </a:t>
+            </a:r>
+            <a:r>
+              <a:rPr lang="en-US" dirty="0" err="1"/>
+              <a:t>eda</a:t>
+            </a:r>
+            <a:r>
+              <a:rPr lang="en-US" dirty="0"/>
+              <a:t>, we can call it in data preparation after we have declared that we will be focusing on </a:t>
+            </a:r>
+            <a:r>
+              <a:rPr lang="en-US" dirty="0" err="1"/>
+              <a:t>illinois</a:t>
+            </a:r>
+            <a:endParaRPr dirty="0"/>
+          </a:p>
+        </p:txBody>
+      </p:sp>
+    </p:spTree>
+    <p:extLst>
+      <p:ext uri="{BB962C8B-B14F-4D97-AF65-F5344CB8AC3E}">
+        <p14:creationId xmlns:p14="http://schemas.microsoft.com/office/powerpoint/2010/main" val="2844477347"/>
+      </p:ext>
+    </p:extLst>
+  </p:cSld>
+  <p:clrMapOvr>
+    <a:masterClrMapping/>
+  </p:clrMapOvr>
+</p:notes>
+</file>
+
+<file path=ppt/notesSlides/notesSlide11.xml><?xml version="1.0" encoding="utf-8"?>
+<p:notes xmlns:a="http://schemas.openxmlformats.org/drawingml/2006/main" xmlns:r="http://schemas.openxmlformats.org/officeDocument/2006/relationships" xmlns:p="http://schemas.openxmlformats.org/presentationml/2006/main" showMasterSp="0" showMasterPhAnim="0">
+  <p:cSld>
+    <p:spTree>
+      <p:nvGrpSpPr>
         <p:cNvPr id="1" name="Shape 137"/>
         <p:cNvGrpSpPr/>
         <p:nvPr/>
@@ -1092,19 +1236,35 @@
           <a:lstStyle/>
           <a:p>
             <a:pPr marL="0" lvl="0" indent="0" algn="l" rtl="0">
-              <a:spcBef>
-                <a:spcPts val="0"/>
-              </a:spcBef>
-              <a:spcAft>
-                <a:spcPts val="0"/>
-              </a:spcAft>
+              <a:lnSpc>
+                <a:spcPct val="100000"/>
+              </a:lnSpc>
+              <a:spcBef>
+                <a:spcPts val="0"/>
+              </a:spcBef>
+              <a:spcAft>
+                <a:spcPts val="0"/>
+              </a:spcAft>
+              <a:buSzPts val="1100"/>
               <a:buNone/>
             </a:pPr>
             <a:r>
-              <a:rPr lang="en-US"/>
-              <a:t>we chose black dog smoke&amp;ale house as our secondary dataset to validate our models in future analysis.</a:t>
+              <a:rPr lang="en-US" dirty="0"/>
+              <a:t>- We cannot state Illinois exploration in </a:t>
             </a:r>
-            <a:endParaRPr/>
+            <a:r>
+              <a:rPr lang="en-US" dirty="0" err="1"/>
+              <a:t>eda</a:t>
+            </a:r>
+            <a:r>
+              <a:rPr lang="en-US" dirty="0"/>
+              <a:t>, we can call it in data preparation after we have declared that we will be focusing on </a:t>
+            </a:r>
+            <a:r>
+              <a:rPr lang="en-US" dirty="0" err="1"/>
+              <a:t>illinois</a:t>
+            </a:r>
+            <a:endParaRPr lang="en-US" dirty="0"/>
           </a:p>
         </p:txBody>
       </p:sp>
@@ -1116,7 +1276,7 @@
 </p:notes>
 </file>
 
-<file path=ppt/notesSlides/notesSlide11.xml><?xml version="1.0" encoding="utf-8"?>
+<file path=ppt/notesSlides/notesSlide12.xml><?xml version="1.0" encoding="utf-8"?>
 <p:notes xmlns:a="http://schemas.openxmlformats.org/drawingml/2006/main" xmlns:r="http://schemas.openxmlformats.org/officeDocument/2006/relationships" xmlns:p="http://schemas.openxmlformats.org/presentationml/2006/main" showMasterSp="0" showMasterPhAnim="0">
   <p:cSld>
     <p:spTree>
@@ -1246,7 +1406,7 @@
 </p:notes>
 </file>
 
-<file path=ppt/notesSlides/notesSlide12.xml><?xml version="1.0" encoding="utf-8"?>
+<file path=ppt/notesSlides/notesSlide13.xml><?xml version="1.0" encoding="utf-8"?>
 <p:notes xmlns:a="http://schemas.openxmlformats.org/drawingml/2006/main" xmlns:r="http://schemas.openxmlformats.org/officeDocument/2006/relationships" xmlns:p="http://schemas.openxmlformats.org/presentationml/2006/main" showMasterSp="0" showMasterPhAnim="0">
   <p:cSld>
     <p:spTree>
@@ -1363,7 +1523,7 @@
 </p:notes>
 </file>
 
-<file path=ppt/notesSlides/notesSlide13.xml><?xml version="1.0" encoding="utf-8"?>
+<file path=ppt/notesSlides/notesSlide14.xml><?xml version="1.0" encoding="utf-8"?>
 <p:notes xmlns:a="http://schemas.openxmlformats.org/drawingml/2006/main" xmlns:r="http://schemas.openxmlformats.org/officeDocument/2006/relationships" xmlns:p="http://schemas.openxmlformats.org/presentationml/2006/main" showMasterSp="0" showMasterPhAnim="0">
   <p:cSld>
     <p:spTree>
@@ -1467,7 +1627,7 @@
 </p:notes>
 </file>
 
-<file path=ppt/notesSlides/notesSlide14.xml><?xml version="1.0" encoding="utf-8"?>
+<file path=ppt/notesSlides/notesSlide15.xml><?xml version="1.0" encoding="utf-8"?>
 <p:notes xmlns:a="http://schemas.openxmlformats.org/drawingml/2006/main" xmlns:r="http://schemas.openxmlformats.org/officeDocument/2006/relationships" xmlns:p="http://schemas.openxmlformats.org/presentationml/2006/main" showMasterSp="0" showMasterPhAnim="0">
   <p:cSld>
     <p:spTree>
@@ -1571,7 +1731,7 @@
 </p:notes>
 </file>
 
-<file path=ppt/notesSlides/notesSlide15.xml><?xml version="1.0" encoding="utf-8"?>
+<file path=ppt/notesSlides/notesSlide16.xml><?xml version="1.0" encoding="utf-8"?>
 <p:notes xmlns:a="http://schemas.openxmlformats.org/drawingml/2006/main" xmlns:r="http://schemas.openxmlformats.org/officeDocument/2006/relationships" xmlns:p="http://schemas.openxmlformats.org/presentationml/2006/main" showMasterSp="0" showMasterPhAnim="0">
   <p:cSld>
     <p:spTree>
@@ -1675,7 +1835,7 @@
 </p:notes>
 </file>
 
-<file path=ppt/notesSlides/notesSlide16.xml><?xml version="1.0" encoding="utf-8"?>
+<file path=ppt/notesSlides/notesSlide17.xml><?xml version="1.0" encoding="utf-8"?>
 <p:notes xmlns:a="http://schemas.openxmlformats.org/drawingml/2006/main" xmlns:r="http://schemas.openxmlformats.org/officeDocument/2006/relationships" xmlns:p="http://schemas.openxmlformats.org/presentationml/2006/main" showMasterSp="0" showMasterPhAnim="0">
   <p:cSld>
     <p:spTree>
@@ -1779,7 +1939,7 @@
 </p:notes>
 </file>
 
-<file path=ppt/notesSlides/notesSlide17.xml><?xml version="1.0" encoding="utf-8"?>
+<file path=ppt/notesSlides/notesSlide18.xml><?xml version="1.0" encoding="utf-8"?>
 <p:notes xmlns:a="http://schemas.openxmlformats.org/drawingml/2006/main" xmlns:r="http://schemas.openxmlformats.org/officeDocument/2006/relationships" xmlns:p="http://schemas.openxmlformats.org/presentationml/2006/main" showMasterSp="0" showMasterPhAnim="0">
   <p:cSld>
     <p:spTree>
@@ -1883,7 +2043,7 @@
 </p:notes>
 </file>
 
-<file path=ppt/notesSlides/notesSlide18.xml><?xml version="1.0" encoding="utf-8"?>
+<file path=ppt/notesSlides/notesSlide19.xml><?xml version="1.0" encoding="utf-8"?>
 <p:notes xmlns:a="http://schemas.openxmlformats.org/drawingml/2006/main" xmlns:r="http://schemas.openxmlformats.org/officeDocument/2006/relationships" xmlns:p="http://schemas.openxmlformats.org/presentationml/2006/main" showMasterSp="0" showMasterPhAnim="0">
   <p:cSld>
     <p:spTree>
@@ -11104,7 +11264,7 @@
               <a:buNone/>
             </a:pPr>
             <a:r>
-              <a:rPr lang="en-US">
+              <a:rPr lang="en-US" dirty="0">
                 <a:solidFill>
                   <a:srgbClr val="000000"/>
                 </a:solidFill>
@@ -11112,7 +11272,7 @@
               <a:t>Business:                       </a:t>
             </a:r>
             <a:r>
-              <a:rPr lang="en-US" sz="1350" b="1">
+              <a:rPr lang="en-US" sz="1350" b="1" dirty="0">
                 <a:solidFill>
                   <a:srgbClr val="000000"/>
                 </a:solidFill>
@@ -11124,9 +11284,9 @@
                 <a:cs typeface="Arial"/>
                 <a:sym typeface="Arial"/>
               </a:rPr>
-              <a:t>Distribution of restaurant business in Illinois</a:t>
+              <a:t>Distribution of businesses in Illinois</a:t>
             </a:r>
-            <a:endParaRPr sz="1350" b="1">
+            <a:endParaRPr sz="1350" b="1" dirty="0">
               <a:solidFill>
                 <a:srgbClr val="000000"/>
               </a:solidFill>
@@ -11153,7 +11313,7 @@
               <a:buSzPts val="1800"/>
               <a:buNone/>
             </a:pPr>
-            <a:endParaRPr sz="1350" b="1">
+            <a:endParaRPr sz="1350" b="1" dirty="0">
               <a:solidFill>
                 <a:srgbClr val="000000"/>
               </a:solidFill>
@@ -11179,7 +11339,7 @@
               </a:spcAft>
               <a:buNone/>
             </a:pPr>
-            <a:endParaRPr sz="1350" b="1">
+            <a:endParaRPr sz="1350" b="1" dirty="0">
               <a:solidFill>
                 <a:srgbClr val="000000"/>
               </a:solidFill>
@@ -11206,7 +11366,7 @@
               <a:buSzPts val="1800"/>
               <a:buNone/>
             </a:pPr>
-            <a:endParaRPr>
+            <a:endParaRPr dirty="0">
               <a:solidFill>
                 <a:srgbClr val="000000"/>
               </a:solidFill>
@@ -11226,7 +11386,668 @@
               <a:buSzPts val="1800"/>
               <a:buNone/>
             </a:pPr>
-            <a:endParaRPr>
+            <a:endParaRPr dirty="0">
+              <a:solidFill>
+                <a:srgbClr val="000000"/>
+              </a:solidFill>
+            </a:endParaRPr>
+          </a:p>
+        </p:txBody>
+      </p:sp>
+      <p:pic>
+        <p:nvPicPr>
+          <p:cNvPr id="1026" name="Picture 2">
+            <a:extLst>
+              <a:ext uri="{FF2B5EF4-FFF2-40B4-BE49-F238E27FC236}">
+                <a16:creationId xmlns:a16="http://schemas.microsoft.com/office/drawing/2014/main" id="{EA5C39C4-F3A1-45BA-B280-7526C534FA50}"/>
+              </a:ext>
+            </a:extLst>
+          </p:cNvPr>
+          <p:cNvPicPr>
+            <a:picLocks noChangeAspect="1" noChangeArrowheads="1"/>
+          </p:cNvPicPr>
+          <p:nvPr/>
+        </p:nvPicPr>
+        <p:blipFill>
+          <a:blip r:embed="rId3">
+            <a:extLst>
+              <a:ext uri="{28A0092B-C50C-407E-A947-70E740481C1C}">
+                <a14:useLocalDpi xmlns:a14="http://schemas.microsoft.com/office/drawing/2010/main" val="0"/>
+              </a:ext>
+            </a:extLst>
+          </a:blip>
+          <a:srcRect/>
+          <a:stretch>
+            <a:fillRect/>
+          </a:stretch>
+        </p:blipFill>
+        <p:spPr bwMode="auto">
+          <a:xfrm>
+            <a:off x="0" y="1134620"/>
+            <a:ext cx="9144000" cy="2459037"/>
+          </a:xfrm>
+          <a:prstGeom prst="rect">
+            <a:avLst/>
+          </a:prstGeom>
+          <a:noFill/>
+          <a:extLst>
+            <a:ext uri="{909E8E84-426E-40DD-AFC4-6F175D3DCCD1}">
+              <a14:hiddenFill xmlns:a14="http://schemas.microsoft.com/office/drawing/2010/main">
+                <a:solidFill>
+                  <a:srgbClr val="FFFFFF"/>
+                </a:solidFill>
+              </a14:hiddenFill>
+            </a:ext>
+          </a:extLst>
+        </p:spPr>
+      </p:pic>
+      <p:sp>
+        <p:nvSpPr>
+          <p:cNvPr id="7" name="Google Shape;114;g83d7f3170d_0_5">
+            <a:extLst>
+              <a:ext uri="{FF2B5EF4-FFF2-40B4-BE49-F238E27FC236}">
+                <a16:creationId xmlns:a16="http://schemas.microsoft.com/office/drawing/2014/main" id="{2B6971E1-34CE-4688-A326-EB991C5D707F}"/>
+              </a:ext>
+            </a:extLst>
+          </p:cNvPr>
+          <p:cNvSpPr txBox="1">
+            <a:spLocks/>
+          </p:cNvSpPr>
+          <p:nvPr/>
+        </p:nvSpPr>
+        <p:spPr>
+          <a:xfrm>
+            <a:off x="311700" y="3593657"/>
+            <a:ext cx="8520600" cy="1125998"/>
+          </a:xfrm>
+          <a:prstGeom prst="rect">
+            <a:avLst/>
+          </a:prstGeom>
+          <a:noFill/>
+          <a:ln>
+            <a:noFill/>
+          </a:ln>
+        </p:spPr>
+        <p:txBody>
+          <a:bodyPr spcFirstLastPara="1" wrap="square" lIns="91425" tIns="91425" rIns="91425" bIns="91425" anchor="t" anchorCtr="0">
+            <a:noAutofit/>
+          </a:bodyPr>
+          <a:lstStyle>
+            <a:defPPr marR="0" lvl="0" algn="l" rtl="0">
+              <a:lnSpc>
+                <a:spcPct val="100000"/>
+              </a:lnSpc>
+              <a:spcBef>
+                <a:spcPts val="0"/>
+              </a:spcBef>
+              <a:spcAft>
+                <a:spcPts val="0"/>
+              </a:spcAft>
+            </a:defPPr>
+            <a:lvl1pPr marL="457200" marR="0" lvl="0" indent="-342900" algn="l" rtl="0">
+              <a:lnSpc>
+                <a:spcPct val="115000"/>
+              </a:lnSpc>
+              <a:spcBef>
+                <a:spcPts val="0"/>
+              </a:spcBef>
+              <a:spcAft>
+                <a:spcPts val="0"/>
+              </a:spcAft>
+              <a:buClr>
+                <a:schemeClr val="accent3"/>
+              </a:buClr>
+              <a:buSzPts val="1800"/>
+              <a:buFont typeface="Average"/>
+              <a:buChar char="●"/>
+              <a:defRPr sz="1800" b="0" i="0" u="none" strike="noStrike" cap="none">
+                <a:solidFill>
+                  <a:schemeClr val="accent3"/>
+                </a:solidFill>
+                <a:latin typeface="Average"/>
+                <a:ea typeface="Average"/>
+                <a:cs typeface="Average"/>
+                <a:sym typeface="Average"/>
+              </a:defRPr>
+            </a:lvl1pPr>
+            <a:lvl2pPr marL="914400" marR="0" lvl="1" indent="-317500" algn="l" rtl="0">
+              <a:lnSpc>
+                <a:spcPct val="115000"/>
+              </a:lnSpc>
+              <a:spcBef>
+                <a:spcPts val="1600"/>
+              </a:spcBef>
+              <a:spcAft>
+                <a:spcPts val="0"/>
+              </a:spcAft>
+              <a:buClr>
+                <a:schemeClr val="accent3"/>
+              </a:buClr>
+              <a:buSzPts val="1400"/>
+              <a:buFont typeface="Average"/>
+              <a:buChar char="○"/>
+              <a:defRPr sz="1400" b="0" i="0" u="none" strike="noStrike" cap="none">
+                <a:solidFill>
+                  <a:schemeClr val="accent3"/>
+                </a:solidFill>
+                <a:latin typeface="Average"/>
+                <a:ea typeface="Average"/>
+                <a:cs typeface="Average"/>
+                <a:sym typeface="Average"/>
+              </a:defRPr>
+            </a:lvl2pPr>
+            <a:lvl3pPr marL="1371600" marR="0" lvl="2" indent="-317500" algn="l" rtl="0">
+              <a:lnSpc>
+                <a:spcPct val="115000"/>
+              </a:lnSpc>
+              <a:spcBef>
+                <a:spcPts val="1600"/>
+              </a:spcBef>
+              <a:spcAft>
+                <a:spcPts val="0"/>
+              </a:spcAft>
+              <a:buClr>
+                <a:schemeClr val="accent3"/>
+              </a:buClr>
+              <a:buSzPts val="1400"/>
+              <a:buFont typeface="Average"/>
+              <a:buChar char="■"/>
+              <a:defRPr sz="1400" b="0" i="0" u="none" strike="noStrike" cap="none">
+                <a:solidFill>
+                  <a:schemeClr val="accent3"/>
+                </a:solidFill>
+                <a:latin typeface="Average"/>
+                <a:ea typeface="Average"/>
+                <a:cs typeface="Average"/>
+                <a:sym typeface="Average"/>
+              </a:defRPr>
+            </a:lvl3pPr>
+            <a:lvl4pPr marL="1828800" marR="0" lvl="3" indent="-317500" algn="l" rtl="0">
+              <a:lnSpc>
+                <a:spcPct val="115000"/>
+              </a:lnSpc>
+              <a:spcBef>
+                <a:spcPts val="1600"/>
+              </a:spcBef>
+              <a:spcAft>
+                <a:spcPts val="0"/>
+              </a:spcAft>
+              <a:buClr>
+                <a:schemeClr val="accent3"/>
+              </a:buClr>
+              <a:buSzPts val="1400"/>
+              <a:buFont typeface="Average"/>
+              <a:buChar char="●"/>
+              <a:defRPr sz="1400" b="0" i="0" u="none" strike="noStrike" cap="none">
+                <a:solidFill>
+                  <a:schemeClr val="accent3"/>
+                </a:solidFill>
+                <a:latin typeface="Average"/>
+                <a:ea typeface="Average"/>
+                <a:cs typeface="Average"/>
+                <a:sym typeface="Average"/>
+              </a:defRPr>
+            </a:lvl4pPr>
+            <a:lvl5pPr marL="2286000" marR="0" lvl="4" indent="-317500" algn="l" rtl="0">
+              <a:lnSpc>
+                <a:spcPct val="115000"/>
+              </a:lnSpc>
+              <a:spcBef>
+                <a:spcPts val="1600"/>
+              </a:spcBef>
+              <a:spcAft>
+                <a:spcPts val="0"/>
+              </a:spcAft>
+              <a:buClr>
+                <a:schemeClr val="accent3"/>
+              </a:buClr>
+              <a:buSzPts val="1400"/>
+              <a:buFont typeface="Average"/>
+              <a:buChar char="○"/>
+              <a:defRPr sz="1400" b="0" i="0" u="none" strike="noStrike" cap="none">
+                <a:solidFill>
+                  <a:schemeClr val="accent3"/>
+                </a:solidFill>
+                <a:latin typeface="Average"/>
+                <a:ea typeface="Average"/>
+                <a:cs typeface="Average"/>
+                <a:sym typeface="Average"/>
+              </a:defRPr>
+            </a:lvl5pPr>
+            <a:lvl6pPr marL="2743200" marR="0" lvl="5" indent="-317500" algn="l" rtl="0">
+              <a:lnSpc>
+                <a:spcPct val="115000"/>
+              </a:lnSpc>
+              <a:spcBef>
+                <a:spcPts val="1600"/>
+              </a:spcBef>
+              <a:spcAft>
+                <a:spcPts val="0"/>
+              </a:spcAft>
+              <a:buClr>
+                <a:schemeClr val="accent3"/>
+              </a:buClr>
+              <a:buSzPts val="1400"/>
+              <a:buFont typeface="Average"/>
+              <a:buChar char="■"/>
+              <a:defRPr sz="1400" b="0" i="0" u="none" strike="noStrike" cap="none">
+                <a:solidFill>
+                  <a:schemeClr val="accent3"/>
+                </a:solidFill>
+                <a:latin typeface="Average"/>
+                <a:ea typeface="Average"/>
+                <a:cs typeface="Average"/>
+                <a:sym typeface="Average"/>
+              </a:defRPr>
+            </a:lvl6pPr>
+            <a:lvl7pPr marL="3200400" marR="0" lvl="6" indent="-317500" algn="l" rtl="0">
+              <a:lnSpc>
+                <a:spcPct val="115000"/>
+              </a:lnSpc>
+              <a:spcBef>
+                <a:spcPts val="1600"/>
+              </a:spcBef>
+              <a:spcAft>
+                <a:spcPts val="0"/>
+              </a:spcAft>
+              <a:buClr>
+                <a:schemeClr val="accent3"/>
+              </a:buClr>
+              <a:buSzPts val="1400"/>
+              <a:buFont typeface="Average"/>
+              <a:buChar char="●"/>
+              <a:defRPr sz="1400" b="0" i="0" u="none" strike="noStrike" cap="none">
+                <a:solidFill>
+                  <a:schemeClr val="accent3"/>
+                </a:solidFill>
+                <a:latin typeface="Average"/>
+                <a:ea typeface="Average"/>
+                <a:cs typeface="Average"/>
+                <a:sym typeface="Average"/>
+              </a:defRPr>
+            </a:lvl7pPr>
+            <a:lvl8pPr marL="3657600" marR="0" lvl="7" indent="-317500" algn="l" rtl="0">
+              <a:lnSpc>
+                <a:spcPct val="115000"/>
+              </a:lnSpc>
+              <a:spcBef>
+                <a:spcPts val="1600"/>
+              </a:spcBef>
+              <a:spcAft>
+                <a:spcPts val="0"/>
+              </a:spcAft>
+              <a:buClr>
+                <a:schemeClr val="accent3"/>
+              </a:buClr>
+              <a:buSzPts val="1400"/>
+              <a:buFont typeface="Average"/>
+              <a:buChar char="○"/>
+              <a:defRPr sz="1400" b="0" i="0" u="none" strike="noStrike" cap="none">
+                <a:solidFill>
+                  <a:schemeClr val="accent3"/>
+                </a:solidFill>
+                <a:latin typeface="Average"/>
+                <a:ea typeface="Average"/>
+                <a:cs typeface="Average"/>
+                <a:sym typeface="Average"/>
+              </a:defRPr>
+            </a:lvl8pPr>
+            <a:lvl9pPr marL="4114800" marR="0" lvl="8" indent="-317500" algn="l" rtl="0">
+              <a:lnSpc>
+                <a:spcPct val="115000"/>
+              </a:lnSpc>
+              <a:spcBef>
+                <a:spcPts val="1600"/>
+              </a:spcBef>
+              <a:spcAft>
+                <a:spcPts val="1600"/>
+              </a:spcAft>
+              <a:buClr>
+                <a:schemeClr val="accent3"/>
+              </a:buClr>
+              <a:buSzPts val="1400"/>
+              <a:buFont typeface="Average"/>
+              <a:buChar char="■"/>
+              <a:defRPr sz="1400" b="0" i="0" u="none" strike="noStrike" cap="none">
+                <a:solidFill>
+                  <a:schemeClr val="accent3"/>
+                </a:solidFill>
+                <a:latin typeface="Average"/>
+                <a:ea typeface="Average"/>
+                <a:cs typeface="Average"/>
+                <a:sym typeface="Average"/>
+              </a:defRPr>
+            </a:lvl9pPr>
+          </a:lstStyle>
+          <a:p>
+            <a:pPr marL="285750" indent="-285750">
+              <a:lnSpc>
+                <a:spcPct val="100000"/>
+              </a:lnSpc>
+              <a:spcBef>
+                <a:spcPts val="1600"/>
+              </a:spcBef>
+              <a:spcAft>
+                <a:spcPts val="1600"/>
+              </a:spcAft>
+              <a:buClrTx/>
+              <a:buFont typeface="Wingdings" panose="05000000000000000000" pitchFamily="2" charset="2"/>
+              <a:buChar char="§"/>
+            </a:pPr>
+            <a:r>
+              <a:rPr lang="en-US" sz="1400" dirty="0">
+                <a:solidFill>
+                  <a:srgbClr val="000000"/>
+                </a:solidFill>
+                <a:latin typeface="+mn-lt"/>
+              </a:rPr>
+              <a:t>The yelp dataset consists of variety of different businesses indicated by the column </a:t>
+            </a:r>
+          </a:p>
+          <a:p>
+            <a:pPr marL="285750" indent="-285750">
+              <a:lnSpc>
+                <a:spcPct val="100000"/>
+              </a:lnSpc>
+              <a:spcBef>
+                <a:spcPts val="1600"/>
+              </a:spcBef>
+              <a:spcAft>
+                <a:spcPts val="1600"/>
+              </a:spcAft>
+              <a:buClrTx/>
+              <a:buFont typeface="Wingdings" panose="05000000000000000000" pitchFamily="2" charset="2"/>
+              <a:buChar char="§"/>
+            </a:pPr>
+            <a:r>
+              <a:rPr lang="en-US" sz="1400" dirty="0">
+                <a:solidFill>
+                  <a:srgbClr val="000000"/>
+                </a:solidFill>
+                <a:latin typeface="+mn-lt"/>
+              </a:rPr>
+              <a:t>Number of entries for the category ‘Restaurants’ was the highest.</a:t>
+            </a:r>
+          </a:p>
+          <a:p>
+            <a:pPr marL="285750" indent="-285750">
+              <a:lnSpc>
+                <a:spcPct val="100000"/>
+              </a:lnSpc>
+              <a:spcBef>
+                <a:spcPts val="1600"/>
+              </a:spcBef>
+              <a:spcAft>
+                <a:spcPts val="1600"/>
+              </a:spcAft>
+              <a:buClrTx/>
+              <a:buFont typeface="Wingdings" panose="05000000000000000000" pitchFamily="2" charset="2"/>
+              <a:buChar char="§"/>
+            </a:pPr>
+            <a:endParaRPr lang="en-US" sz="1400" dirty="0">
+              <a:solidFill>
+                <a:srgbClr val="000000"/>
+              </a:solidFill>
+              <a:latin typeface="+mn-lt"/>
+            </a:endParaRPr>
+          </a:p>
+        </p:txBody>
+      </p:sp>
+    </p:spTree>
+  </p:cSld>
+  <p:clrMapOvr>
+    <a:masterClrMapping/>
+  </p:clrMapOvr>
+</p:sld>
+</file>
+
+<file path=ppt/slides/slide11.xml><?xml version="1.0" encoding="utf-8"?>
+<p:sld xmlns:a="http://schemas.openxmlformats.org/drawingml/2006/main" xmlns:r="http://schemas.openxmlformats.org/officeDocument/2006/relationships" xmlns:p="http://schemas.openxmlformats.org/presentationml/2006/main">
+  <p:cSld>
+    <p:spTree>
+      <p:nvGrpSpPr>
+        <p:cNvPr id="1" name="Shape 133"/>
+        <p:cNvGrpSpPr/>
+        <p:nvPr/>
+      </p:nvGrpSpPr>
+      <p:grpSpPr>
+        <a:xfrm>
+          <a:off x="0" y="0"/>
+          <a:ext cx="0" cy="0"/>
+          <a:chOff x="0" y="0"/>
+          <a:chExt cx="0" cy="0"/>
+        </a:xfrm>
+      </p:grpSpPr>
+      <p:sp>
+        <p:nvSpPr>
+          <p:cNvPr id="134" name="Google Shape;134;g83ddf61570_0_20"/>
+          <p:cNvSpPr txBox="1">
+            <a:spLocks noGrp="1"/>
+          </p:cNvSpPr>
+          <p:nvPr>
+            <p:ph type="title"/>
+          </p:nvPr>
+        </p:nvSpPr>
+        <p:spPr>
+          <a:xfrm>
+            <a:off x="0" y="0"/>
+            <a:ext cx="6279900" cy="678000"/>
+          </a:xfrm>
+          <a:prstGeom prst="rect">
+            <a:avLst/>
+          </a:prstGeom>
+          <a:noFill/>
+          <a:ln>
+            <a:noFill/>
+          </a:ln>
+        </p:spPr>
+        <p:txBody>
+          <a:bodyPr spcFirstLastPara="1" wrap="square" lIns="91425" tIns="91425" rIns="91425" bIns="91425" anchor="t" anchorCtr="0">
+            <a:noAutofit/>
+          </a:bodyPr>
+          <a:lstStyle/>
+          <a:p>
+            <a:pPr marL="0" lvl="0" indent="0" algn="l" rtl="0">
+              <a:lnSpc>
+                <a:spcPct val="100000"/>
+              </a:lnSpc>
+              <a:spcBef>
+                <a:spcPts val="0"/>
+              </a:spcBef>
+              <a:spcAft>
+                <a:spcPts val="0"/>
+              </a:spcAft>
+              <a:buSzPts val="3000"/>
+              <a:buNone/>
+            </a:pPr>
+            <a:r>
+              <a:rPr lang="en-US" dirty="0">
+                <a:solidFill>
+                  <a:srgbClr val="000000"/>
+                </a:solidFill>
+                <a:highlight>
+                  <a:srgbClr val="FF0000"/>
+                </a:highlight>
+              </a:rPr>
+              <a:t>Exploratory Data Analysis</a:t>
+            </a:r>
+            <a:endParaRPr dirty="0">
+              <a:solidFill>
+                <a:srgbClr val="000000"/>
+              </a:solidFill>
+              <a:highlight>
+                <a:srgbClr val="FF0000"/>
+              </a:highlight>
+            </a:endParaRPr>
+          </a:p>
+        </p:txBody>
+      </p:sp>
+      <p:sp>
+        <p:nvSpPr>
+          <p:cNvPr id="135" name="Google Shape;135;g83ddf61570_0_20"/>
+          <p:cNvSpPr txBox="1">
+            <a:spLocks noGrp="1"/>
+          </p:cNvSpPr>
+          <p:nvPr>
+            <p:ph type="body" idx="1"/>
+          </p:nvPr>
+        </p:nvSpPr>
+        <p:spPr>
+          <a:xfrm>
+            <a:off x="156322" y="785393"/>
+            <a:ext cx="7072500" cy="532200"/>
+          </a:xfrm>
+          <a:prstGeom prst="rect">
+            <a:avLst/>
+          </a:prstGeom>
+          <a:noFill/>
+          <a:ln>
+            <a:noFill/>
+          </a:ln>
+        </p:spPr>
+        <p:txBody>
+          <a:bodyPr spcFirstLastPara="1" wrap="square" lIns="91425" tIns="91425" rIns="91425" bIns="91425" anchor="t" anchorCtr="0">
+            <a:noAutofit/>
+          </a:bodyPr>
+          <a:lstStyle/>
+          <a:p>
+            <a:pPr marL="0" lvl="0" indent="0" algn="l" rtl="0">
+              <a:lnSpc>
+                <a:spcPct val="115000"/>
+              </a:lnSpc>
+              <a:spcBef>
+                <a:spcPts val="0"/>
+              </a:spcBef>
+              <a:spcAft>
+                <a:spcPts val="0"/>
+              </a:spcAft>
+              <a:buSzPts val="1800"/>
+              <a:buNone/>
+            </a:pPr>
+            <a:r>
+              <a:rPr lang="en-US" dirty="0">
+                <a:solidFill>
+                  <a:srgbClr val="000000"/>
+                </a:solidFill>
+              </a:rPr>
+              <a:t>Business:                       </a:t>
+            </a:r>
+            <a:r>
+              <a:rPr lang="en-US" sz="1350" b="1" dirty="0">
+                <a:solidFill>
+                  <a:srgbClr val="000000"/>
+                </a:solidFill>
+                <a:highlight>
+                  <a:srgbClr val="FFFFFF"/>
+                </a:highlight>
+                <a:latin typeface="Arial"/>
+                <a:ea typeface="Arial"/>
+                <a:cs typeface="Arial"/>
+                <a:sym typeface="Arial"/>
+              </a:rPr>
+              <a:t>Distribution of restaurant business in Illinois</a:t>
+            </a:r>
+            <a:endParaRPr sz="1350" b="1" dirty="0">
+              <a:solidFill>
+                <a:srgbClr val="000000"/>
+              </a:solidFill>
+              <a:highlight>
+                <a:srgbClr val="FFFFFF"/>
+              </a:highlight>
+              <a:latin typeface="Arial"/>
+              <a:ea typeface="Arial"/>
+              <a:cs typeface="Arial"/>
+              <a:sym typeface="Arial"/>
+            </a:endParaRPr>
+          </a:p>
+          <a:p>
+            <a:pPr marL="0" lvl="0" indent="0" algn="l" rtl="0">
+              <a:lnSpc>
+                <a:spcPct val="115000"/>
+              </a:lnSpc>
+              <a:spcBef>
+                <a:spcPts val="0"/>
+              </a:spcBef>
+              <a:spcAft>
+                <a:spcPts val="0"/>
+              </a:spcAft>
+              <a:buSzPts val="1800"/>
+              <a:buNone/>
+            </a:pPr>
+            <a:endParaRPr sz="1350" b="1" dirty="0">
+              <a:solidFill>
+                <a:srgbClr val="000000"/>
+              </a:solidFill>
+              <a:highlight>
+                <a:srgbClr val="FFFFFF"/>
+              </a:highlight>
+              <a:latin typeface="Arial"/>
+              <a:ea typeface="Arial"/>
+              <a:cs typeface="Arial"/>
+              <a:sym typeface="Arial"/>
+            </a:endParaRPr>
+          </a:p>
+          <a:p>
+            <a:pPr marL="0" lvl="0" indent="0" algn="l" rtl="0">
+              <a:lnSpc>
+                <a:spcPct val="100000"/>
+              </a:lnSpc>
+              <a:spcBef>
+                <a:spcPts val="1000"/>
+              </a:spcBef>
+              <a:spcAft>
+                <a:spcPts val="0"/>
+              </a:spcAft>
+              <a:buNone/>
+            </a:pPr>
+            <a:endParaRPr sz="1350" b="1" dirty="0">
+              <a:solidFill>
+                <a:srgbClr val="000000"/>
+              </a:solidFill>
+              <a:highlight>
+                <a:srgbClr val="FFFFFF"/>
+              </a:highlight>
+              <a:latin typeface="Arial"/>
+              <a:ea typeface="Arial"/>
+              <a:cs typeface="Arial"/>
+              <a:sym typeface="Arial"/>
+            </a:endParaRPr>
+          </a:p>
+          <a:p>
+            <a:pPr marL="0" lvl="0" indent="0" algn="l" rtl="0">
+              <a:lnSpc>
+                <a:spcPct val="115000"/>
+              </a:lnSpc>
+              <a:spcBef>
+                <a:spcPts val="1600"/>
+              </a:spcBef>
+              <a:spcAft>
+                <a:spcPts val="0"/>
+              </a:spcAft>
+              <a:buSzPts val="1800"/>
+              <a:buNone/>
+            </a:pPr>
+            <a:endParaRPr dirty="0">
+              <a:solidFill>
+                <a:srgbClr val="000000"/>
+              </a:solidFill>
+            </a:endParaRPr>
+          </a:p>
+          <a:p>
+            <a:pPr marL="0" lvl="0" indent="0" algn="l" rtl="0">
+              <a:lnSpc>
+                <a:spcPct val="115000"/>
+              </a:lnSpc>
+              <a:spcBef>
+                <a:spcPts val="1600"/>
+              </a:spcBef>
+              <a:spcAft>
+                <a:spcPts val="1600"/>
+              </a:spcAft>
+              <a:buSzPts val="1800"/>
+              <a:buNone/>
+            </a:pPr>
+            <a:endParaRPr dirty="0">
               <a:solidFill>
                 <a:srgbClr val="000000"/>
               </a:solidFill>
@@ -11250,8 +12071,8 @@
         </p:blipFill>
         <p:spPr>
           <a:xfrm>
-            <a:off x="761675" y="1263225"/>
-            <a:ext cx="7688458" cy="3880274"/>
+            <a:off x="587071" y="1136516"/>
+            <a:ext cx="7559401" cy="3118089"/>
           </a:xfrm>
           <a:prstGeom prst="rect">
             <a:avLst/>
@@ -11263,6 +12084,11 @@
         </p:spPr>
       </p:pic>
     </p:spTree>
+    <p:extLst>
+      <p:ext uri="{BB962C8B-B14F-4D97-AF65-F5344CB8AC3E}">
+        <p14:creationId xmlns:p14="http://schemas.microsoft.com/office/powerpoint/2010/main" val="117015801"/>
+      </p:ext>
+    </p:extLst>
   </p:cSld>
   <p:clrMapOvr>
     <a:masterClrMapping/>
@@ -11270,7 +12096,7 @@
 </p:sld>
 </file>
 
-<file path=ppt/slides/slide11.xml><?xml version="1.0" encoding="utf-8"?>
+<file path=ppt/slides/slide12.xml><?xml version="1.0" encoding="utf-8"?>
 <p:sld xmlns:a="http://schemas.openxmlformats.org/drawingml/2006/main" xmlns:r="http://schemas.openxmlformats.org/officeDocument/2006/relationships" xmlns:p="http://schemas.openxmlformats.org/presentationml/2006/main">
   <p:cSld>
     <p:spTree>
@@ -11327,14 +12153,21 @@
               <a:buNone/>
             </a:pPr>
             <a:r>
-              <a:rPr lang="en-US">
+              <a:rPr lang="en-US" dirty="0">
                 <a:solidFill>
                   <a:srgbClr val="000000"/>
                 </a:solidFill>
+                <a:highlight>
+                  <a:srgbClr val="FF0000"/>
+                </a:highlight>
               </a:rPr>
               <a:t>Exploratory Data Analysis</a:t>
             </a:r>
-            <a:endParaRPr/>
+            <a:endParaRPr dirty="0">
+              <a:highlight>
+                <a:srgbClr val="FF0000"/>
+              </a:highlight>
+            </a:endParaRPr>
           </a:p>
         </p:txBody>
       </p:sp>
@@ -11481,7 +12314,7 @@
 </p:sld>
 </file>
 
-<file path=ppt/slides/slide12.xml><?xml version="1.0" encoding="utf-8"?>
+<file path=ppt/slides/slide13.xml><?xml version="1.0" encoding="utf-8"?>
 <p:sld xmlns:a="http://schemas.openxmlformats.org/drawingml/2006/main" xmlns:r="http://schemas.openxmlformats.org/officeDocument/2006/relationships" xmlns:p="http://schemas.openxmlformats.org/presentationml/2006/main">
   <p:cSld>
     <p:spTree>
@@ -11624,7 +12457,7 @@
 </p:sld>
 </file>
 
-<file path=ppt/slides/slide13.xml><?xml version="1.0" encoding="utf-8"?>
+<file path=ppt/slides/slide14.xml><?xml version="1.0" encoding="utf-8"?>
 <p:sld xmlns:a="http://schemas.openxmlformats.org/drawingml/2006/main" xmlns:r="http://schemas.openxmlformats.org/officeDocument/2006/relationships" xmlns:p="http://schemas.openxmlformats.org/presentationml/2006/main">
   <p:cSld>
     <p:spTree>
@@ -12208,6 +13041,13 @@
               </a:rPr>
               <a:t>Hybrid Matrix Factorization</a:t>
             </a:r>
+          </a:p>
+          <a:p>
+            <a:pPr marL="342900" lvl="0" indent="-342900" algn="just">
+              <a:buSzPts val="1600"/>
+              <a:buFont typeface="Wingdings" panose="05000000000000000000" pitchFamily="2" charset="2"/>
+              <a:buChar char="§"/>
+            </a:pPr>
             <a:endParaRPr lang="en-US" sz="1800" dirty="0"/>
           </a:p>
           <a:p>
@@ -12231,7 +13071,7 @@
 </p:sld>
 </file>
 
-<file path=ppt/slides/slide14.xml><?xml version="1.0" encoding="utf-8"?>
+<file path=ppt/slides/slide15.xml><?xml version="1.0" encoding="utf-8"?>
 <p:sld xmlns:a="http://schemas.openxmlformats.org/drawingml/2006/main" xmlns:r="http://schemas.openxmlformats.org/officeDocument/2006/relationships" xmlns:p="http://schemas.openxmlformats.org/presentationml/2006/main">
   <p:cSld>
     <p:spTree>
@@ -12344,7 +13184,7 @@
 </p:sld>
 </file>
 
-<file path=ppt/slides/slide15.xml><?xml version="1.0" encoding="utf-8"?>
+<file path=ppt/slides/slide16.xml><?xml version="1.0" encoding="utf-8"?>
 <p:sld xmlns:a="http://schemas.openxmlformats.org/drawingml/2006/main" xmlns:r="http://schemas.openxmlformats.org/officeDocument/2006/relationships" xmlns:p="http://schemas.openxmlformats.org/presentationml/2006/main">
   <p:cSld>
     <p:spTree>
@@ -12469,7 +13309,7 @@
 </p:sld>
 </file>
 
-<file path=ppt/slides/slide16.xml><?xml version="1.0" encoding="utf-8"?>
+<file path=ppt/slides/slide17.xml><?xml version="1.0" encoding="utf-8"?>
 <p:sld xmlns:a="http://schemas.openxmlformats.org/drawingml/2006/main" xmlns:r="http://schemas.openxmlformats.org/officeDocument/2006/relationships" xmlns:p="http://schemas.openxmlformats.org/presentationml/2006/main">
   <p:cSld>
     <p:spTree>
@@ -12590,7 +13430,7 @@
 </p:sld>
 </file>
 
-<file path=ppt/slides/slide17.xml><?xml version="1.0" encoding="utf-8"?>
+<file path=ppt/slides/slide18.xml><?xml version="1.0" encoding="utf-8"?>
 <p:sld xmlns:a="http://schemas.openxmlformats.org/drawingml/2006/main" xmlns:r="http://schemas.openxmlformats.org/officeDocument/2006/relationships" xmlns:p="http://schemas.openxmlformats.org/presentationml/2006/main">
   <p:cSld>
     <p:spTree>
@@ -12699,7 +13539,7 @@
 </p:sld>
 </file>
 
-<file path=ppt/slides/slide18.xml><?xml version="1.0" encoding="utf-8"?>
+<file path=ppt/slides/slide19.xml><?xml version="1.0" encoding="utf-8"?>
 <p:sld xmlns:a="http://schemas.openxmlformats.org/drawingml/2006/main" xmlns:r="http://schemas.openxmlformats.org/officeDocument/2006/relationships" xmlns:p="http://schemas.openxmlformats.org/presentationml/2006/main">
   <p:cSld>
     <p:spTree>
@@ -12765,107 +13605,6 @@
       <p:sp>
         <p:nvSpPr>
           <p:cNvPr id="180" name="Google Shape;180;g83f00c33ef_0_32"/>
-          <p:cNvSpPr txBox="1">
-            <a:spLocks noGrp="1"/>
-          </p:cNvSpPr>
-          <p:nvPr>
-            <p:ph type="body" idx="1"/>
-          </p:nvPr>
-        </p:nvSpPr>
-        <p:spPr>
-          <a:xfrm>
-            <a:off x="311700" y="1152475"/>
-            <a:ext cx="8520600" cy="3416400"/>
-          </a:xfrm>
-          <a:prstGeom prst="rect">
-            <a:avLst/>
-          </a:prstGeom>
-        </p:spPr>
-        <p:txBody>
-          <a:bodyPr spcFirstLastPara="1" wrap="square" lIns="91425" tIns="91425" rIns="91425" bIns="91425" anchor="t" anchorCtr="0">
-            <a:noAutofit/>
-          </a:bodyPr>
-          <a:lstStyle/>
-          <a:p>
-            <a:pPr marL="0" lvl="0" indent="0" algn="l" rtl="0">
-              <a:spcBef>
-                <a:spcPts val="0"/>
-              </a:spcBef>
-              <a:spcAft>
-                <a:spcPts val="0"/>
-              </a:spcAft>
-              <a:buNone/>
-            </a:pPr>
-            <a:endParaRPr/>
-          </a:p>
-        </p:txBody>
-      </p:sp>
-    </p:spTree>
-  </p:cSld>
-  <p:clrMapOvr>
-    <a:masterClrMapping/>
-  </p:clrMapOvr>
-</p:sld>
-</file>
-
-<file path=ppt/slides/slide19.xml><?xml version="1.0" encoding="utf-8"?>
-<p:sld xmlns:a="http://schemas.openxmlformats.org/drawingml/2006/main" xmlns:r="http://schemas.openxmlformats.org/officeDocument/2006/relationships" xmlns:p="http://schemas.openxmlformats.org/presentationml/2006/main">
-  <p:cSld>
-    <p:spTree>
-      <p:nvGrpSpPr>
-        <p:cNvPr id="1" name="Shape 184"/>
-        <p:cNvGrpSpPr/>
-        <p:nvPr/>
-      </p:nvGrpSpPr>
-      <p:grpSpPr>
-        <a:xfrm>
-          <a:off x="0" y="0"/>
-          <a:ext cx="0" cy="0"/>
-          <a:chOff x="0" y="0"/>
-          <a:chExt cx="0" cy="0"/>
-        </a:xfrm>
-      </p:grpSpPr>
-      <p:sp>
-        <p:nvSpPr>
-          <p:cNvPr id="185" name="Google Shape;185;g83f00c33ef_0_37"/>
-          <p:cNvSpPr txBox="1">
-            <a:spLocks noGrp="1"/>
-          </p:cNvSpPr>
-          <p:nvPr>
-            <p:ph type="title"/>
-          </p:nvPr>
-        </p:nvSpPr>
-        <p:spPr>
-          <a:xfrm>
-            <a:off x="82475" y="98238"/>
-            <a:ext cx="1584900" cy="572700"/>
-          </a:xfrm>
-          <a:prstGeom prst="rect">
-            <a:avLst/>
-          </a:prstGeom>
-        </p:spPr>
-        <p:txBody>
-          <a:bodyPr spcFirstLastPara="1" wrap="square" lIns="91425" tIns="91425" rIns="91425" bIns="91425" anchor="t" anchorCtr="0">
-            <a:noAutofit/>
-          </a:bodyPr>
-          <a:lstStyle/>
-          <a:p>
-            <a:pPr marL="0" lvl="0" indent="0" algn="l" rtl="0">
-              <a:spcBef>
-                <a:spcPts val="0"/>
-              </a:spcBef>
-              <a:spcAft>
-                <a:spcPts val="0"/>
-              </a:spcAft>
-              <a:buNone/>
-            </a:pPr>
-            <a:endParaRPr/>
-          </a:p>
-        </p:txBody>
-      </p:sp>
-      <p:sp>
-        <p:nvSpPr>
-          <p:cNvPr id="186" name="Google Shape;186;g83f00c33ef_0_37"/>
           <p:cNvSpPr txBox="1">
             <a:spLocks noGrp="1"/>
           </p:cNvSpPr>
@@ -13189,6 +13928,107 @@
               <a:cs typeface="Average"/>
               <a:sym typeface="Average"/>
             </a:endParaRPr>
+          </a:p>
+        </p:txBody>
+      </p:sp>
+    </p:spTree>
+  </p:cSld>
+  <p:clrMapOvr>
+    <a:masterClrMapping/>
+  </p:clrMapOvr>
+</p:sld>
+</file>
+
+<file path=ppt/slides/slide20.xml><?xml version="1.0" encoding="utf-8"?>
+<p:sld xmlns:a="http://schemas.openxmlformats.org/drawingml/2006/main" xmlns:r="http://schemas.openxmlformats.org/officeDocument/2006/relationships" xmlns:p="http://schemas.openxmlformats.org/presentationml/2006/main">
+  <p:cSld>
+    <p:spTree>
+      <p:nvGrpSpPr>
+        <p:cNvPr id="1" name="Shape 184"/>
+        <p:cNvGrpSpPr/>
+        <p:nvPr/>
+      </p:nvGrpSpPr>
+      <p:grpSpPr>
+        <a:xfrm>
+          <a:off x="0" y="0"/>
+          <a:ext cx="0" cy="0"/>
+          <a:chOff x="0" y="0"/>
+          <a:chExt cx="0" cy="0"/>
+        </a:xfrm>
+      </p:grpSpPr>
+      <p:sp>
+        <p:nvSpPr>
+          <p:cNvPr id="185" name="Google Shape;185;g83f00c33ef_0_37"/>
+          <p:cNvSpPr txBox="1">
+            <a:spLocks noGrp="1"/>
+          </p:cNvSpPr>
+          <p:nvPr>
+            <p:ph type="title"/>
+          </p:nvPr>
+        </p:nvSpPr>
+        <p:spPr>
+          <a:xfrm>
+            <a:off x="82475" y="98238"/>
+            <a:ext cx="1584900" cy="572700"/>
+          </a:xfrm>
+          <a:prstGeom prst="rect">
+            <a:avLst/>
+          </a:prstGeom>
+        </p:spPr>
+        <p:txBody>
+          <a:bodyPr spcFirstLastPara="1" wrap="square" lIns="91425" tIns="91425" rIns="91425" bIns="91425" anchor="t" anchorCtr="0">
+            <a:noAutofit/>
+          </a:bodyPr>
+          <a:lstStyle/>
+          <a:p>
+            <a:pPr marL="0" lvl="0" indent="0" algn="l" rtl="0">
+              <a:spcBef>
+                <a:spcPts val="0"/>
+              </a:spcBef>
+              <a:spcAft>
+                <a:spcPts val="0"/>
+              </a:spcAft>
+              <a:buNone/>
+            </a:pPr>
+            <a:endParaRPr/>
+          </a:p>
+        </p:txBody>
+      </p:sp>
+      <p:sp>
+        <p:nvSpPr>
+          <p:cNvPr id="186" name="Google Shape;186;g83f00c33ef_0_37"/>
+          <p:cNvSpPr txBox="1">
+            <a:spLocks noGrp="1"/>
+          </p:cNvSpPr>
+          <p:nvPr>
+            <p:ph type="body" idx="1"/>
+          </p:nvPr>
+        </p:nvSpPr>
+        <p:spPr>
+          <a:xfrm>
+            <a:off x="311700" y="1152475"/>
+            <a:ext cx="8520600" cy="3416400"/>
+          </a:xfrm>
+          <a:prstGeom prst="rect">
+            <a:avLst/>
+          </a:prstGeom>
+        </p:spPr>
+        <p:txBody>
+          <a:bodyPr spcFirstLastPara="1" wrap="square" lIns="91425" tIns="91425" rIns="91425" bIns="91425" anchor="t" anchorCtr="0">
+            <a:noAutofit/>
+          </a:bodyPr>
+          <a:lstStyle/>
+          <a:p>
+            <a:pPr marL="0" lvl="0" indent="0" algn="l" rtl="0">
+              <a:spcBef>
+                <a:spcPts val="0"/>
+              </a:spcBef>
+              <a:spcAft>
+                <a:spcPts val="0"/>
+              </a:spcAft>
+              <a:buNone/>
+            </a:pPr>
+            <a:endParaRPr/>
           </a:p>
         </p:txBody>
       </p:sp>
@@ -14760,11 +15600,13 @@
             </a:lvl9pPr>
           </a:lstStyle>
           <a:p>
-            <a:pPr marL="0" lvl="0" indent="0">
+            <a:pPr marL="285750" lvl="0" indent="-285750">
               <a:lnSpc>
                 <a:spcPct val="115000"/>
               </a:lnSpc>
               <a:buSzPts val="1800"/>
+              <a:buFont typeface="Arial" panose="020B0604020202020204" pitchFamily="34" charset="0"/>
+              <a:buChar char="•"/>
             </a:pPr>
             <a:r>
               <a:rPr lang="en-US" dirty="0">
@@ -14773,103 +15615,40 @@
                 </a:solidFill>
                 <a:latin typeface="Arial"/>
               </a:rPr>
-              <a:t>The original review dataset is fairly large (&gt; 5GB) thus we filtered out the data to contain the subset of original data using following considerations. </a:t>
+              <a:t>Businesses with open = 1 tag were only considered</a:t>
             </a:r>
           </a:p>
           <a:p>
-            <a:pPr marL="457200" lvl="0" indent="-342900">
+            <a:pPr marL="285750" lvl="0" indent="-285750">
               <a:lnSpc>
                 <a:spcPct val="115000"/>
               </a:lnSpc>
-              <a:spcBef>
-                <a:spcPts val="1600"/>
-              </a:spcBef>
               <a:buSzPts val="1800"/>
-              <a:buAutoNum type="arabicParenR"/>
+              <a:buFont typeface="Arial" panose="020B0604020202020204" pitchFamily="34" charset="0"/>
+              <a:buChar char="•"/>
             </a:pPr>
-            <a:r>
-              <a:rPr lang="en-US" dirty="0">
-                <a:solidFill>
-                  <a:srgbClr val="000000"/>
-                </a:solidFill>
-                <a:latin typeface="Arial"/>
-              </a:rPr>
-              <a:t>Since the data contained entries from across United States we filtered out the data to only contain values from Illinois.</a:t>
-            </a:r>
+            <a:endParaRPr lang="en-US" dirty="0">
+              <a:solidFill>
+                <a:srgbClr val="000000"/>
+              </a:solidFill>
+              <a:latin typeface="Arial"/>
+            </a:endParaRPr>
           </a:p>
           <a:p>
-            <a:pPr marL="457200" lvl="0" indent="-342900">
+            <a:pPr marL="285750" lvl="0" indent="-285750">
               <a:lnSpc>
                 <a:spcPct val="115000"/>
               </a:lnSpc>
               <a:buSzPts val="1800"/>
-              <a:buAutoNum type="arabicParenR"/>
+              <a:buFont typeface="Arial" panose="020B0604020202020204" pitchFamily="34" charset="0"/>
+              <a:buChar char="•"/>
             </a:pPr>
-            <a:r>
-              <a:rPr lang="en-US" dirty="0">
-                <a:solidFill>
-                  <a:srgbClr val="000000"/>
-                </a:solidFill>
-                <a:latin typeface="Arial"/>
-              </a:rPr>
-              <a:t>We converted the json data into csv format for modeling following data analysis and data cleaning.</a:t>
-            </a:r>
-          </a:p>
-          <a:p>
-            <a:pPr marL="457200" lvl="0" indent="-342900">
-              <a:lnSpc>
-                <a:spcPct val="115000"/>
-              </a:lnSpc>
-              <a:buSzPts val="1800"/>
-              <a:buFont typeface="Arial"/>
-              <a:buAutoNum type="arabicParenR"/>
-            </a:pPr>
-            <a:r>
-              <a:rPr lang="en-US" dirty="0">
-                <a:solidFill>
-                  <a:srgbClr val="000000"/>
-                </a:solidFill>
-                <a:latin typeface="Arial"/>
-              </a:rPr>
-              <a:t>We explored restaurant attributes that would potentially be useful in recommenders.</a:t>
-            </a:r>
-          </a:p>
-          <a:p>
-            <a:pPr marL="457200" lvl="0" indent="-342900">
-              <a:lnSpc>
-                <a:spcPct val="115000"/>
-              </a:lnSpc>
-              <a:buSzPts val="1800"/>
-              <a:buFont typeface="Arial"/>
-              <a:buAutoNum type="arabicParenR"/>
-            </a:pPr>
-            <a:r>
-              <a:rPr lang="en-US" dirty="0">
-                <a:solidFill>
-                  <a:srgbClr val="000000"/>
-                </a:solidFill>
-                <a:latin typeface="Arial"/>
-              </a:rPr>
-              <a:t>We filtered Illinois users and reviews datasets by matching their </a:t>
-            </a:r>
-            <a:r>
-              <a:rPr lang="en-US" dirty="0" err="1">
-                <a:solidFill>
-                  <a:srgbClr val="000000"/>
-                </a:solidFill>
-                <a:latin typeface="Arial"/>
-              </a:rPr>
-              <a:t>user_ids</a:t>
-            </a:r>
-            <a:r>
-              <a:rPr lang="en-US" dirty="0">
-                <a:solidFill>
-                  <a:srgbClr val="000000"/>
-                </a:solidFill>
-                <a:latin typeface="Arial"/>
-              </a:rPr>
-              <a:t> with our Illinois business dataset.</a:t>
-            </a:r>
+            <a:endParaRPr lang="en-US" dirty="0">
+              <a:solidFill>
+                <a:srgbClr val="000000"/>
+              </a:solidFill>
+              <a:latin typeface="Arial"/>
+            </a:endParaRPr>
           </a:p>
         </p:txBody>
       </p:sp>
@@ -14999,14 +15778,14 @@
               <a:buNone/>
             </a:pPr>
             <a:r>
-              <a:rPr lang="en-US">
+              <a:rPr lang="en-US" dirty="0">
                 <a:solidFill>
                   <a:srgbClr val="000000"/>
                 </a:solidFill>
               </a:rPr>
               <a:t>1. column value extraction:- Extracted values (such as cuisine type, theme, etc.) from the category column of business data. Since we were creating a recommender system for restaurants in Illinois, we extracted records of restaurants in Illinois only.</a:t>
             </a:r>
-            <a:endParaRPr>
+            <a:endParaRPr dirty="0">
               <a:solidFill>
                 <a:srgbClr val="000000"/>
               </a:solidFill>
@@ -15027,14 +15806,14 @@
               <a:buNone/>
             </a:pPr>
             <a:r>
-              <a:rPr lang="en-US">
+              <a:rPr lang="en-US" dirty="0">
                 <a:solidFill>
                   <a:srgbClr val="000000"/>
                 </a:solidFill>
               </a:rPr>
               <a:t>2. Null Values:- There were lot of columns with null values, mainly in the columns which were extracted from the category column, so we removed those columns which had null value count more than 300.</a:t>
             </a:r>
-            <a:endParaRPr>
+            <a:endParaRPr dirty="0">
               <a:solidFill>
                 <a:srgbClr val="000000"/>
               </a:solidFill>
@@ -15055,14 +15834,14 @@
               <a:buNone/>
             </a:pPr>
             <a:r>
-              <a:rPr lang="en-US">
+              <a:rPr lang="en-US" dirty="0">
                 <a:solidFill>
                   <a:srgbClr val="000000"/>
                 </a:solidFill>
               </a:rPr>
               <a:t>3. Duplicate Record:- In Users data, there were lot of users who gave multiple reviews to the same restaurants. For that, we kept the most recent one and removed the others.</a:t>
             </a:r>
-            <a:endParaRPr>
+            <a:endParaRPr dirty="0">
               <a:solidFill>
                 <a:srgbClr val="000000"/>
               </a:solidFill>
@@ -15082,7 +15861,7 @@
               <a:buSzPts val="1800"/>
               <a:buNone/>
             </a:pPr>
-            <a:endParaRPr>
+            <a:endParaRPr dirty="0">
               <a:solidFill>
                 <a:srgbClr val="000000"/>
               </a:solidFill>

</xml_diff>